<commit_message>
Made minor changes to our final presentation.
</commit_message>
<xml_diff>
--- a/JHUIimmunoFINAL.pptx
+++ b/JHUIimmunoFINAL.pptx
@@ -14843,81 +14843,60 @@
           <a:lstStyle/>
           <a:p>
             <a:r>
-              <a:rPr lang="en-US" sz="1800" dirty="0" smtClean="0"/>
+              <a:rPr lang="en-US" sz="2800" dirty="0" smtClean="0"/>
               <a:t>Questions</a:t>
             </a:r>
           </a:p>
           <a:p>
             <a:pPr lvl="1"/>
             <a:r>
-              <a:rPr lang="en-US" sz="1800" dirty="0" smtClean="0"/>
+              <a:rPr lang="en-US" sz="2800" dirty="0" smtClean="0"/>
               <a:t>Why are certain peptides immunogenic? </a:t>
             </a:r>
-            <a:endParaRPr lang="en-US" sz="1800" dirty="0"/>
+            <a:endParaRPr lang="en-US" sz="2800" dirty="0"/>
           </a:p>
           <a:p>
             <a:pPr lvl="1"/>
             <a:r>
-              <a:rPr lang="en-US" sz="1800" dirty="0" smtClean="0"/>
+              <a:rPr lang="en-US" sz="2800" dirty="0" smtClean="0"/>
               <a:t>How do amino acid positions and properties affect immunogenicity?</a:t>
             </a:r>
           </a:p>
           <a:p>
-            <a:pPr lvl="1"/>
-            <a:endParaRPr lang="en-US" sz="1800" dirty="0"/>
-          </a:p>
-          <a:p>
-            <a:pPr lvl="1"/>
-            <a:endParaRPr lang="en-US" sz="1800" dirty="0" smtClean="0"/>
-          </a:p>
-          <a:p>
-            <a:pPr marL="468630" lvl="1" indent="0">
-              <a:buNone/>
-            </a:pPr>
-            <a:endParaRPr lang="en-US" sz="1800" dirty="0" smtClean="0"/>
-          </a:p>
-          <a:p>
-            <a:pPr lvl="1"/>
-            <a:endParaRPr lang="en-US" sz="1800" dirty="0" smtClean="0"/>
-          </a:p>
-          <a:p>
-            <a:endParaRPr lang="en-US" sz="1800" dirty="0"/>
-          </a:p>
-          <a:p>
             <a:r>
-              <a:rPr lang="en-US" sz="1800" dirty="0" smtClean="0"/>
+              <a:rPr lang="en-US" sz="2800" dirty="0"/>
               <a:t>Challenges </a:t>
             </a:r>
           </a:p>
           <a:p>
             <a:pPr lvl="1"/>
             <a:r>
-              <a:rPr lang="en-US" sz="1800" dirty="0"/>
+              <a:rPr lang="en-US" sz="2800" dirty="0"/>
               <a:t>Data search and consolidation </a:t>
             </a:r>
           </a:p>
           <a:p>
             <a:pPr lvl="1"/>
             <a:r>
-              <a:rPr lang="en-US" sz="1800" dirty="0"/>
+              <a:rPr lang="en-US" sz="2800" dirty="0"/>
               <a:t>Human dataset only has one non-immunogenic peptide</a:t>
             </a:r>
           </a:p>
           <a:p>
             <a:pPr lvl="1"/>
-            <a:endParaRPr lang="en-US" sz="1800" dirty="0" smtClean="0"/>
+            <a:endParaRPr lang="en-US" sz="2800" dirty="0" smtClean="0"/>
           </a:p>
           <a:p>
             <a:pPr lvl="1"/>
-            <a:endParaRPr lang="en-US" sz="1800" dirty="0" smtClean="0"/>
+            <a:endParaRPr lang="en-US" sz="2800" dirty="0" smtClean="0"/>
           </a:p>
           <a:p>
             <a:pPr lvl="1"/>
-            <a:endParaRPr lang="en-US" sz="1800" dirty="0" smtClean="0"/>
+            <a:endParaRPr lang="en-US" sz="2800" dirty="0" smtClean="0"/>
           </a:p>
           <a:p>
             <a:pPr lvl="1"/>
-            <a:endParaRPr lang="en-US" sz="1800" dirty="0" smtClean="0"/>
+            <a:endParaRPr lang="en-US" sz="2800" dirty="0" smtClean="0"/>
           </a:p>
         </p:txBody>
       </p:sp>
@@ -15022,7 +15001,7 @@
           <a:graphicData uri="http://schemas.openxmlformats.org/presentationml/2006/ole">
             <mc:AlternateContent xmlns:mc="http://schemas.openxmlformats.org/markup-compatibility/2006">
               <mc:Choice xmlns:v="urn:schemas-microsoft-com:vml" Requires="v">
-                <p:oleObj spid="_x0000_s1026" name="Worksheet" r:id="rId3" imgW="3975100" imgH="2108200" progId="Excel.Sheet.12">
+                <p:oleObj spid="_x0000_s1030" name="Worksheet" r:id="rId3" imgW="3975100" imgH="2108200" progId="Excel.Sheet.12">
                   <p:embed/>
                 </p:oleObj>
               </mc:Choice>
@@ -15109,6 +15088,7 @@
           </a:bodyPr>
           <a:lstStyle/>
           <a:p>
+            <a:pPr algn="ctr"/>
             <a:r>
               <a:rPr lang="en-US" dirty="0"/>
               <a:t>Which amino acid position </a:t>
@@ -15194,8 +15174,8 @@
         </p:blipFill>
         <p:spPr>
           <a:xfrm>
-            <a:off x="0" y="2484615"/>
-            <a:ext cx="9146254" cy="2484617"/>
+            <a:off x="0" y="1914073"/>
+            <a:ext cx="9146254" cy="3055159"/>
           </a:xfrm>
           <a:prstGeom prst="rect">
             <a:avLst/>
@@ -15226,7 +15206,7 @@
             <a:pPr algn="ctr"/>
             <a:r>
               <a:rPr lang="en-US" sz="3200" dirty="0"/>
-              <a:t>The most important amino acid properties in predicting immunogenicity</a:t>
+              <a:t>THE MOST IMPORTANT AMINO ACID PROPERTIES IN PREDICTING IMMUNOGENICITY</a:t>
             </a:r>
           </a:p>
         </p:txBody>

</xml_diff>

<commit_message>
Very minor changes to final presentation.
</commit_message>
<xml_diff>
--- a/JHUIimmunoFINAL.pptx
+++ b/JHUIimmunoFINAL.pptx
@@ -4,6 +4,9 @@
   <p:sldMasterIdLst>
     <p:sldMasterId id="2147483660" r:id="rId1"/>
   </p:sldMasterIdLst>
+  <p:notesMasterIdLst>
+    <p:notesMasterId r:id="rId8"/>
+  </p:notesMasterIdLst>
   <p:sldIdLst>
     <p:sldId id="256" r:id="rId2"/>
     <p:sldId id="257" r:id="rId3"/>
@@ -304,6 +307,440 @@
     <c:autoUpdate val="0"/>
   </c:externalData>
 </c:chartSpace>
+</file>
+
+<file path=ppt/notesMasters/notesMaster1.xml><?xml version="1.0" encoding="utf-8"?>
+<p:notesMaster xmlns:a="http://schemas.openxmlformats.org/drawingml/2006/main" xmlns:r="http://schemas.openxmlformats.org/officeDocument/2006/relationships" xmlns:p="http://schemas.openxmlformats.org/presentationml/2006/main">
+  <p:cSld>
+    <p:bg>
+      <p:bgRef idx="1001">
+        <a:schemeClr val="bg1"/>
+      </p:bgRef>
+    </p:bg>
+    <p:spTree>
+      <p:nvGrpSpPr>
+        <p:cNvPr id="1" name=""/>
+        <p:cNvGrpSpPr/>
+        <p:nvPr/>
+      </p:nvGrpSpPr>
+      <p:grpSpPr>
+        <a:xfrm>
+          <a:off x="0" y="0"/>
+          <a:ext cx="0" cy="0"/>
+          <a:chOff x="0" y="0"/>
+          <a:chExt cx="0" cy="0"/>
+        </a:xfrm>
+      </p:grpSpPr>
+      <p:sp>
+        <p:nvSpPr>
+          <p:cNvPr id="2" name="Header Placeholder 1"/>
+          <p:cNvSpPr>
+            <a:spLocks noGrp="1"/>
+          </p:cNvSpPr>
+          <p:nvPr>
+            <p:ph type="hdr" sz="quarter"/>
+          </p:nvPr>
+        </p:nvSpPr>
+        <p:spPr>
+          <a:xfrm>
+            <a:off x="0" y="0"/>
+            <a:ext cx="2971800" cy="457200"/>
+          </a:xfrm>
+          <a:prstGeom prst="rect">
+            <a:avLst/>
+          </a:prstGeom>
+        </p:spPr>
+        <p:txBody>
+          <a:bodyPr vert="horz" lIns="91440" tIns="45720" rIns="91440" bIns="45720" rtlCol="0"/>
+          <a:lstStyle>
+            <a:lvl1pPr algn="l">
+              <a:defRPr sz="1200"/>
+            </a:lvl1pPr>
+          </a:lstStyle>
+          <a:p>
+            <a:endParaRPr lang="en-US"/>
+          </a:p>
+        </p:txBody>
+      </p:sp>
+      <p:sp>
+        <p:nvSpPr>
+          <p:cNvPr id="3" name="Date Placeholder 2"/>
+          <p:cNvSpPr>
+            <a:spLocks noGrp="1"/>
+          </p:cNvSpPr>
+          <p:nvPr>
+            <p:ph type="dt" idx="1"/>
+          </p:nvPr>
+        </p:nvSpPr>
+        <p:spPr>
+          <a:xfrm>
+            <a:off x="3884613" y="0"/>
+            <a:ext cx="2971800" cy="457200"/>
+          </a:xfrm>
+          <a:prstGeom prst="rect">
+            <a:avLst/>
+          </a:prstGeom>
+        </p:spPr>
+        <p:txBody>
+          <a:bodyPr vert="horz" lIns="91440" tIns="45720" rIns="91440" bIns="45720" rtlCol="0"/>
+          <a:lstStyle>
+            <a:lvl1pPr algn="r">
+              <a:defRPr sz="1200"/>
+            </a:lvl1pPr>
+          </a:lstStyle>
+          <a:p>
+            <a:fld id="{1347B64A-4AB9-7C4A-914D-D1EA294F5DCD}" type="datetimeFigureOut">
+              <a:rPr lang="en-US" smtClean="0"/>
+              <a:t>9/23/15</a:t>
+            </a:fld>
+            <a:endParaRPr lang="en-US"/>
+          </a:p>
+        </p:txBody>
+      </p:sp>
+      <p:sp>
+        <p:nvSpPr>
+          <p:cNvPr id="4" name="Slide Image Placeholder 3"/>
+          <p:cNvSpPr>
+            <a:spLocks noGrp="1" noRot="1" noChangeAspect="1"/>
+          </p:cNvSpPr>
+          <p:nvPr>
+            <p:ph type="sldImg" idx="2"/>
+          </p:nvPr>
+        </p:nvSpPr>
+        <p:spPr>
+          <a:xfrm>
+            <a:off x="1143000" y="685800"/>
+            <a:ext cx="4572000" cy="3429000"/>
+          </a:xfrm>
+          <a:prstGeom prst="rect">
+            <a:avLst/>
+          </a:prstGeom>
+          <a:noFill/>
+          <a:ln w="12700">
+            <a:solidFill>
+              <a:prstClr val="black"/>
+            </a:solidFill>
+          </a:ln>
+        </p:spPr>
+        <p:txBody>
+          <a:bodyPr vert="horz" lIns="91440" tIns="45720" rIns="91440" bIns="45720" rtlCol="0" anchor="ctr"/>
+          <a:lstStyle/>
+          <a:p>
+            <a:endParaRPr lang="en-US"/>
+          </a:p>
+        </p:txBody>
+      </p:sp>
+      <p:sp>
+        <p:nvSpPr>
+          <p:cNvPr id="5" name="Notes Placeholder 4"/>
+          <p:cNvSpPr>
+            <a:spLocks noGrp="1"/>
+          </p:cNvSpPr>
+          <p:nvPr>
+            <p:ph type="body" sz="quarter" idx="3"/>
+          </p:nvPr>
+        </p:nvSpPr>
+        <p:spPr>
+          <a:xfrm>
+            <a:off x="685800" y="4343400"/>
+            <a:ext cx="5486400" cy="4114800"/>
+          </a:xfrm>
+          <a:prstGeom prst="rect">
+            <a:avLst/>
+          </a:prstGeom>
+        </p:spPr>
+        <p:txBody>
+          <a:bodyPr vert="horz" lIns="91440" tIns="45720" rIns="91440" bIns="45720" rtlCol="0"/>
+          <a:lstStyle/>
+          <a:p>
+            <a:pPr lvl="0"/>
+            <a:r>
+              <a:rPr lang="pl-PL" smtClean="0"/>
+              <a:t>Click to edit Master text styles</a:t>
+            </a:r>
+          </a:p>
+          <a:p>
+            <a:pPr lvl="1"/>
+            <a:r>
+              <a:rPr lang="pl-PL" smtClean="0"/>
+              <a:t>Second level</a:t>
+            </a:r>
+          </a:p>
+          <a:p>
+            <a:pPr lvl="2"/>
+            <a:r>
+              <a:rPr lang="pl-PL" smtClean="0"/>
+              <a:t>Third level</a:t>
+            </a:r>
+          </a:p>
+          <a:p>
+            <a:pPr lvl="3"/>
+            <a:r>
+              <a:rPr lang="pl-PL" smtClean="0"/>
+              <a:t>Fourth level</a:t>
+            </a:r>
+          </a:p>
+          <a:p>
+            <a:pPr lvl="4"/>
+            <a:r>
+              <a:rPr lang="pl-PL" smtClean="0"/>
+              <a:t>Fifth level</a:t>
+            </a:r>
+            <a:endParaRPr lang="en-US"/>
+          </a:p>
+        </p:txBody>
+      </p:sp>
+      <p:sp>
+        <p:nvSpPr>
+          <p:cNvPr id="6" name="Footer Placeholder 5"/>
+          <p:cNvSpPr>
+            <a:spLocks noGrp="1"/>
+          </p:cNvSpPr>
+          <p:nvPr>
+            <p:ph type="ftr" sz="quarter" idx="4"/>
+          </p:nvPr>
+        </p:nvSpPr>
+        <p:spPr>
+          <a:xfrm>
+            <a:off x="0" y="8685213"/>
+            <a:ext cx="2971800" cy="457200"/>
+          </a:xfrm>
+          <a:prstGeom prst="rect">
+            <a:avLst/>
+          </a:prstGeom>
+        </p:spPr>
+        <p:txBody>
+          <a:bodyPr vert="horz" lIns="91440" tIns="45720" rIns="91440" bIns="45720" rtlCol="0" anchor="b"/>
+          <a:lstStyle>
+            <a:lvl1pPr algn="l">
+              <a:defRPr sz="1200"/>
+            </a:lvl1pPr>
+          </a:lstStyle>
+          <a:p>
+            <a:endParaRPr lang="en-US"/>
+          </a:p>
+        </p:txBody>
+      </p:sp>
+      <p:sp>
+        <p:nvSpPr>
+          <p:cNvPr id="7" name="Slide Number Placeholder 6"/>
+          <p:cNvSpPr>
+            <a:spLocks noGrp="1"/>
+          </p:cNvSpPr>
+          <p:nvPr>
+            <p:ph type="sldNum" sz="quarter" idx="5"/>
+          </p:nvPr>
+        </p:nvSpPr>
+        <p:spPr>
+          <a:xfrm>
+            <a:off x="3884613" y="8685213"/>
+            <a:ext cx="2971800" cy="457200"/>
+          </a:xfrm>
+          <a:prstGeom prst="rect">
+            <a:avLst/>
+          </a:prstGeom>
+        </p:spPr>
+        <p:txBody>
+          <a:bodyPr vert="horz" lIns="91440" tIns="45720" rIns="91440" bIns="45720" rtlCol="0" anchor="b"/>
+          <a:lstStyle>
+            <a:lvl1pPr algn="r">
+              <a:defRPr sz="1200"/>
+            </a:lvl1pPr>
+          </a:lstStyle>
+          <a:p>
+            <a:fld id="{3E82480E-7789-364F-8B74-E8789FFBB3E2}" type="slidenum">
+              <a:rPr lang="en-US" smtClean="0"/>
+              <a:t>‹#›</a:t>
+            </a:fld>
+            <a:endParaRPr lang="en-US"/>
+          </a:p>
+        </p:txBody>
+      </p:sp>
+    </p:spTree>
+    <p:extLst>
+      <p:ext uri="{BB962C8B-B14F-4D97-AF65-F5344CB8AC3E}">
+        <p14:creationId xmlns:p14="http://schemas.microsoft.com/office/powerpoint/2010/main" val="3950436762"/>
+      </p:ext>
+    </p:extLst>
+  </p:cSld>
+  <p:clrMap bg1="lt1" tx1="dk1" bg2="lt2" tx2="dk2" accent1="accent1" accent2="accent2" accent3="accent3" accent4="accent4" accent5="accent5" accent6="accent6" hlink="hlink" folHlink="folHlink"/>
+  <p:notesStyle>
+    <a:lvl1pPr marL="0" algn="l" defTabSz="457200" rtl="0" eaLnBrk="1" latinLnBrk="0" hangingPunct="1">
+      <a:defRPr sz="1200" kern="1200">
+        <a:solidFill>
+          <a:schemeClr val="tx1"/>
+        </a:solidFill>
+        <a:latin typeface="+mn-lt"/>
+        <a:ea typeface="+mn-ea"/>
+        <a:cs typeface="+mn-cs"/>
+      </a:defRPr>
+    </a:lvl1pPr>
+    <a:lvl2pPr marL="457200" algn="l" defTabSz="457200" rtl="0" eaLnBrk="1" latinLnBrk="0" hangingPunct="1">
+      <a:defRPr sz="1200" kern="1200">
+        <a:solidFill>
+          <a:schemeClr val="tx1"/>
+        </a:solidFill>
+        <a:latin typeface="+mn-lt"/>
+        <a:ea typeface="+mn-ea"/>
+        <a:cs typeface="+mn-cs"/>
+      </a:defRPr>
+    </a:lvl2pPr>
+    <a:lvl3pPr marL="914400" algn="l" defTabSz="457200" rtl="0" eaLnBrk="1" latinLnBrk="0" hangingPunct="1">
+      <a:defRPr sz="1200" kern="1200">
+        <a:solidFill>
+          <a:schemeClr val="tx1"/>
+        </a:solidFill>
+        <a:latin typeface="+mn-lt"/>
+        <a:ea typeface="+mn-ea"/>
+        <a:cs typeface="+mn-cs"/>
+      </a:defRPr>
+    </a:lvl3pPr>
+    <a:lvl4pPr marL="1371600" algn="l" defTabSz="457200" rtl="0" eaLnBrk="1" latinLnBrk="0" hangingPunct="1">
+      <a:defRPr sz="1200" kern="1200">
+        <a:solidFill>
+          <a:schemeClr val="tx1"/>
+        </a:solidFill>
+        <a:latin typeface="+mn-lt"/>
+        <a:ea typeface="+mn-ea"/>
+        <a:cs typeface="+mn-cs"/>
+      </a:defRPr>
+    </a:lvl4pPr>
+    <a:lvl5pPr marL="1828800" algn="l" defTabSz="457200" rtl="0" eaLnBrk="1" latinLnBrk="0" hangingPunct="1">
+      <a:defRPr sz="1200" kern="1200">
+        <a:solidFill>
+          <a:schemeClr val="tx1"/>
+        </a:solidFill>
+        <a:latin typeface="+mn-lt"/>
+        <a:ea typeface="+mn-ea"/>
+        <a:cs typeface="+mn-cs"/>
+      </a:defRPr>
+    </a:lvl5pPr>
+    <a:lvl6pPr marL="2286000" algn="l" defTabSz="457200" rtl="0" eaLnBrk="1" latinLnBrk="0" hangingPunct="1">
+      <a:defRPr sz="1200" kern="1200">
+        <a:solidFill>
+          <a:schemeClr val="tx1"/>
+        </a:solidFill>
+        <a:latin typeface="+mn-lt"/>
+        <a:ea typeface="+mn-ea"/>
+        <a:cs typeface="+mn-cs"/>
+      </a:defRPr>
+    </a:lvl6pPr>
+    <a:lvl7pPr marL="2743200" algn="l" defTabSz="457200" rtl="0" eaLnBrk="1" latinLnBrk="0" hangingPunct="1">
+      <a:defRPr sz="1200" kern="1200">
+        <a:solidFill>
+          <a:schemeClr val="tx1"/>
+        </a:solidFill>
+        <a:latin typeface="+mn-lt"/>
+        <a:ea typeface="+mn-ea"/>
+        <a:cs typeface="+mn-cs"/>
+      </a:defRPr>
+    </a:lvl7pPr>
+    <a:lvl8pPr marL="3200400" algn="l" defTabSz="457200" rtl="0" eaLnBrk="1" latinLnBrk="0" hangingPunct="1">
+      <a:defRPr sz="1200" kern="1200">
+        <a:solidFill>
+          <a:schemeClr val="tx1"/>
+        </a:solidFill>
+        <a:latin typeface="+mn-lt"/>
+        <a:ea typeface="+mn-ea"/>
+        <a:cs typeface="+mn-cs"/>
+      </a:defRPr>
+    </a:lvl8pPr>
+    <a:lvl9pPr marL="3657600" algn="l" defTabSz="457200" rtl="0" eaLnBrk="1" latinLnBrk="0" hangingPunct="1">
+      <a:defRPr sz="1200" kern="1200">
+        <a:solidFill>
+          <a:schemeClr val="tx1"/>
+        </a:solidFill>
+        <a:latin typeface="+mn-lt"/>
+        <a:ea typeface="+mn-ea"/>
+        <a:cs typeface="+mn-cs"/>
+      </a:defRPr>
+    </a:lvl9pPr>
+  </p:notesStyle>
+</p:notesMaster>
+</file>
+
+<file path=ppt/notesSlides/notesSlide1.xml><?xml version="1.0" encoding="utf-8"?>
+<p:notes xmlns:a="http://schemas.openxmlformats.org/drawingml/2006/main" xmlns:r="http://schemas.openxmlformats.org/officeDocument/2006/relationships" xmlns:p="http://schemas.openxmlformats.org/presentationml/2006/main">
+  <p:cSld>
+    <p:spTree>
+      <p:nvGrpSpPr>
+        <p:cNvPr id="1" name=""/>
+        <p:cNvGrpSpPr/>
+        <p:nvPr/>
+      </p:nvGrpSpPr>
+      <p:grpSpPr>
+        <a:xfrm>
+          <a:off x="0" y="0"/>
+          <a:ext cx="0" cy="0"/>
+          <a:chOff x="0" y="0"/>
+          <a:chExt cx="0" cy="0"/>
+        </a:xfrm>
+      </p:grpSpPr>
+      <p:sp>
+        <p:nvSpPr>
+          <p:cNvPr id="2" name="Slide Image Placeholder 1"/>
+          <p:cNvSpPr>
+            <a:spLocks noGrp="1" noRot="1" noChangeAspect="1"/>
+          </p:cNvSpPr>
+          <p:nvPr>
+            <p:ph type="sldImg"/>
+          </p:nvPr>
+        </p:nvSpPr>
+        <p:spPr/>
+      </p:sp>
+      <p:sp>
+        <p:nvSpPr>
+          <p:cNvPr id="3" name="Notes Placeholder 2"/>
+          <p:cNvSpPr>
+            <a:spLocks noGrp="1"/>
+          </p:cNvSpPr>
+          <p:nvPr>
+            <p:ph type="body" idx="1"/>
+          </p:nvPr>
+        </p:nvSpPr>
+        <p:spPr/>
+        <p:txBody>
+          <a:bodyPr/>
+          <a:lstStyle/>
+          <a:p>
+            <a:endParaRPr lang="en-US" dirty="0"/>
+          </a:p>
+        </p:txBody>
+      </p:sp>
+      <p:sp>
+        <p:nvSpPr>
+          <p:cNvPr id="4" name="Slide Number Placeholder 3"/>
+          <p:cNvSpPr>
+            <a:spLocks noGrp="1"/>
+          </p:cNvSpPr>
+          <p:nvPr>
+            <p:ph type="sldNum" sz="quarter" idx="10"/>
+          </p:nvPr>
+        </p:nvSpPr>
+        <p:spPr/>
+        <p:txBody>
+          <a:bodyPr/>
+          <a:lstStyle/>
+          <a:p>
+            <a:fld id="{3E82480E-7789-364F-8B74-E8789FFBB3E2}" type="slidenum">
+              <a:rPr lang="en-US" smtClean="0"/>
+              <a:t>5</a:t>
+            </a:fld>
+            <a:endParaRPr lang="en-US"/>
+          </a:p>
+        </p:txBody>
+      </p:sp>
+    </p:spTree>
+    <p:extLst>
+      <p:ext uri="{BB962C8B-B14F-4D97-AF65-F5344CB8AC3E}">
+        <p14:creationId xmlns:p14="http://schemas.microsoft.com/office/powerpoint/2010/main" val="1595069940"/>
+      </p:ext>
+    </p:extLst>
+  </p:cSld>
+  <p:clrMapOvr>
+    <a:masterClrMapping/>
+  </p:clrMapOvr>
+</p:notes>
 </file>
 
 <file path=ppt/slideLayouts/slideLayout1.xml><?xml version="1.0" encoding="utf-8"?>
@@ -14494,8 +14931,8 @@
         </p:nvSpPr>
         <p:spPr>
           <a:xfrm>
-            <a:off x="1982226" y="2004986"/>
-            <a:ext cx="4794983" cy="479260"/>
+            <a:off x="0" y="2004986"/>
+            <a:ext cx="9144000" cy="479260"/>
           </a:xfrm>
         </p:spPr>
         <p:txBody>
@@ -14506,22 +14943,42 @@
           <a:p>
             <a:pPr algn="ctr"/>
             <a:r>
-              <a:rPr lang="en-US" sz="3200" dirty="0"/>
+              <a:rPr lang="en-US" sz="3200" dirty="0">
+                <a:solidFill>
+                  <a:schemeClr val="tx1"/>
+                </a:solidFill>
+              </a:rPr>
               <a:t>(</a:t>
             </a:r>
             <a:r>
-              <a:rPr lang="en-US" sz="3200" dirty="0" err="1"/>
+              <a:rPr lang="en-US" sz="3200" dirty="0" err="1">
+                <a:solidFill>
+                  <a:schemeClr val="tx1"/>
+                </a:solidFill>
+              </a:rPr>
               <a:t>Immuno</a:t>
             </a:r>
             <a:r>
-              <a:rPr lang="en-US" sz="3200" dirty="0"/>
+              <a:rPr lang="en-US" sz="3200" dirty="0">
+                <a:solidFill>
+                  <a:schemeClr val="tx1"/>
+                </a:solidFill>
+              </a:rPr>
               <a:t>)genomics </a:t>
             </a:r>
             <a:r>
-              <a:rPr lang="en-US" sz="3200" dirty="0" smtClean="0"/>
+              <a:rPr lang="en-US" sz="3200" dirty="0" smtClean="0">
+                <a:solidFill>
+                  <a:schemeClr val="tx1"/>
+                </a:solidFill>
+              </a:rPr>
               <a:t>Group</a:t>
             </a:r>
-            <a:endParaRPr lang="en-US" sz="3200" dirty="0"/>
+            <a:endParaRPr lang="en-US" sz="3200" dirty="0">
+              <a:solidFill>
+                <a:schemeClr val="tx1"/>
+              </a:solidFill>
+            </a:endParaRPr>
           </a:p>
         </p:txBody>
       </p:sp>
@@ -14533,8 +14990,8 @@
         </p:nvSpPr>
         <p:spPr>
           <a:xfrm>
-            <a:off x="3407471" y="4808046"/>
-            <a:ext cx="1746730" cy="369332"/>
+            <a:off x="3288373" y="4808046"/>
+            <a:ext cx="1920292" cy="400110"/>
           </a:xfrm>
           <a:prstGeom prst="rect">
             <a:avLst/>
@@ -14547,18 +15004,18 @@
           <a:lstStyle/>
           <a:p>
             <a:r>
-              <a:rPr lang="en-US" dirty="0" err="1"/>
+              <a:rPr lang="en-US" sz="2000" dirty="0" err="1"/>
               <a:t>Zaheer</a:t>
             </a:r>
             <a:r>
-              <a:rPr lang="en-US" dirty="0"/>
+              <a:rPr lang="en-US" sz="2000" dirty="0"/>
               <a:t> </a:t>
             </a:r>
             <a:r>
-              <a:rPr lang="en-US" dirty="0" err="1"/>
+              <a:rPr lang="en-US" sz="2000" dirty="0" err="1"/>
               <a:t>Valivullah</a:t>
             </a:r>
-            <a:endParaRPr lang="en-US" dirty="0"/>
+            <a:endParaRPr lang="en-US" sz="2000" dirty="0"/>
           </a:p>
         </p:txBody>
       </p:sp>
@@ -14570,8 +15027,8 @@
         </p:nvSpPr>
         <p:spPr>
           <a:xfrm>
-            <a:off x="3407471" y="4468458"/>
-            <a:ext cx="1402948" cy="369332"/>
+            <a:off x="3288373" y="4486104"/>
+            <a:ext cx="1544012" cy="400110"/>
           </a:xfrm>
           <a:prstGeom prst="rect">
             <a:avLst/>
@@ -14584,11 +15041,11 @@
           <a:lstStyle/>
           <a:p>
             <a:r>
-              <a:rPr lang="en-US" dirty="0" err="1"/>
+              <a:rPr lang="en-US" sz="2000" dirty="0" err="1"/>
               <a:t>Wenjing</a:t>
             </a:r>
             <a:r>
-              <a:rPr lang="en-US" dirty="0"/>
+              <a:rPr lang="en-US" sz="2000" dirty="0"/>
               <a:t> Yang</a:t>
             </a:r>
           </a:p>
@@ -14602,8 +15059,8 @@
         </p:nvSpPr>
         <p:spPr>
           <a:xfrm>
-            <a:off x="3407471" y="3215665"/>
-            <a:ext cx="1441846" cy="369332"/>
+            <a:off x="3288373" y="3198333"/>
+            <a:ext cx="1581533" cy="400110"/>
           </a:xfrm>
           <a:prstGeom prst="rect">
             <a:avLst/>
@@ -14616,7 +15073,7 @@
           <a:lstStyle/>
           <a:p>
             <a:r>
-              <a:rPr lang="en-US" dirty="0"/>
+              <a:rPr lang="en-US" sz="2000" dirty="0"/>
               <a:t>Brian Chaplin</a:t>
             </a:r>
           </a:p>
@@ -14630,8 +15087,8 @@
         </p:nvSpPr>
         <p:spPr>
           <a:xfrm>
-            <a:off x="3407471" y="2876391"/>
-            <a:ext cx="2566816" cy="369332"/>
+            <a:off x="3288373" y="2876391"/>
+            <a:ext cx="2831499" cy="400110"/>
           </a:xfrm>
           <a:prstGeom prst="rect">
             <a:avLst/>
@@ -14644,22 +15101,22 @@
           <a:lstStyle/>
           <a:p>
             <a:r>
-              <a:rPr lang="en-US" dirty="0"/>
+              <a:rPr lang="en-US" sz="2000" dirty="0"/>
               <a:t>Andre </a:t>
             </a:r>
             <a:r>
-              <a:rPr lang="en-US" dirty="0" err="1"/>
+              <a:rPr lang="en-US" sz="2000" dirty="0" err="1"/>
               <a:t>Tadeu</a:t>
             </a:r>
             <a:r>
-              <a:rPr lang="en-US" dirty="0"/>
+              <a:rPr lang="en-US" sz="2000" dirty="0"/>
               <a:t> de </a:t>
             </a:r>
             <a:r>
-              <a:rPr lang="en-US" dirty="0" err="1"/>
+              <a:rPr lang="en-US" sz="2000" dirty="0" err="1"/>
               <a:t>Carvalho</a:t>
             </a:r>
-            <a:endParaRPr lang="en-US" dirty="0"/>
+            <a:endParaRPr lang="en-US" sz="2000" dirty="0"/>
           </a:p>
         </p:txBody>
       </p:sp>
@@ -14671,8 +15128,8 @@
         </p:nvSpPr>
         <p:spPr>
           <a:xfrm>
-            <a:off x="3407471" y="3545128"/>
-            <a:ext cx="2459628" cy="369332"/>
+            <a:off x="3288373" y="3520275"/>
+            <a:ext cx="2712401" cy="400110"/>
           </a:xfrm>
           <a:prstGeom prst="rect">
             <a:avLst/>
@@ -14685,18 +15142,18 @@
           <a:lstStyle/>
           <a:p>
             <a:r>
-              <a:rPr lang="en-US" dirty="0" err="1"/>
+              <a:rPr lang="en-US" sz="2000" dirty="0" err="1"/>
               <a:t>Hernán</a:t>
             </a:r>
             <a:r>
-              <a:rPr lang="en-US" dirty="0"/>
+              <a:rPr lang="en-US" sz="2000" dirty="0"/>
               <a:t> </a:t>
             </a:r>
             <a:r>
-              <a:rPr lang="en-US" dirty="0" err="1"/>
+              <a:rPr lang="en-US" sz="2000" dirty="0" err="1"/>
               <a:t>Martínez-Foffani</a:t>
             </a:r>
-            <a:endParaRPr lang="en-US" dirty="0"/>
+            <a:endParaRPr lang="en-US" sz="2000" dirty="0"/>
           </a:p>
         </p:txBody>
       </p:sp>
@@ -14708,8 +15165,8 @@
         </p:nvSpPr>
         <p:spPr>
           <a:xfrm>
-            <a:off x="3407471" y="4143707"/>
-            <a:ext cx="1200982" cy="369332"/>
+            <a:off x="3288373" y="4164161"/>
+            <a:ext cx="1313906" cy="400110"/>
           </a:xfrm>
           <a:prstGeom prst="rect">
             <a:avLst/>
@@ -14722,11 +15179,11 @@
           <a:lstStyle/>
           <a:p>
             <a:r>
-              <a:rPr lang="en-US" dirty="0" err="1"/>
+              <a:rPr lang="en-US" sz="2000" dirty="0" err="1"/>
               <a:t>Yixing</a:t>
             </a:r>
             <a:r>
-              <a:rPr lang="en-US" dirty="0"/>
+              <a:rPr lang="en-US" sz="2000" dirty="0"/>
               <a:t> Han</a:t>
             </a:r>
           </a:p>
@@ -14740,8 +15197,8 @@
         </p:nvSpPr>
         <p:spPr>
           <a:xfrm>
-            <a:off x="3407471" y="3830070"/>
-            <a:ext cx="1835433" cy="369332"/>
+            <a:off x="3288373" y="3842218"/>
+            <a:ext cx="2018852" cy="400110"/>
           </a:xfrm>
           <a:prstGeom prst="rect">
             <a:avLst/>
@@ -14754,7 +15211,7 @@
           <a:lstStyle/>
           <a:p>
             <a:r>
-              <a:rPr lang="en-US" dirty="0"/>
+              <a:rPr lang="en-US" sz="2000" dirty="0"/>
               <a:t>Martin Skarzynski</a:t>
             </a:r>
           </a:p>
@@ -15001,7 +15458,7 @@
           <a:graphicData uri="http://schemas.openxmlformats.org/presentationml/2006/ole">
             <mc:AlternateContent xmlns:mc="http://schemas.openxmlformats.org/markup-compatibility/2006">
               <mc:Choice xmlns:v="urn:schemas-microsoft-com:vml" Requires="v">
-                <p:oleObj spid="_x0000_s1030" name="Worksheet" r:id="rId3" imgW="3975100" imgH="2108200" progId="Excel.Sheet.12">
+                <p:oleObj spid="_x0000_s1033" name="Worksheet" r:id="rId3" imgW="3975100" imgH="2108200" progId="Excel.Sheet.12">
                   <p:embed/>
                 </p:oleObj>
               </mc:Choice>
@@ -15167,7 +15624,7 @@
           <p:nvPr/>
         </p:nvPicPr>
         <p:blipFill>
-          <a:blip r:embed="rId2"/>
+          <a:blip r:embed="rId3"/>
           <a:stretch>
             <a:fillRect/>
           </a:stretch>
@@ -15275,30 +15732,6 @@
               <a:rPr lang="en-US" dirty="0"/>
               <a:t>THANK YOU FOR LISTENING AND FOR MAKING THIS SUCH A WONDERFUL EVENT!</a:t>
             </a:r>
-          </a:p>
-        </p:txBody>
-      </p:sp>
-      <p:sp>
-        <p:nvSpPr>
-          <p:cNvPr id="3" name="Content Placeholder 2"/>
-          <p:cNvSpPr>
-            <a:spLocks noGrp="1"/>
-          </p:cNvSpPr>
-          <p:nvPr>
-            <p:ph idx="1"/>
-          </p:nvPr>
-        </p:nvSpPr>
-        <p:spPr>
-          <a:xfrm>
-            <a:off x="9411026" y="1600201"/>
-            <a:ext cx="7772400" cy="3733800"/>
-          </a:xfrm>
-        </p:spPr>
-        <p:txBody>
-          <a:bodyPr/>
-          <a:lstStyle/>
-          <a:p>
-            <a:endParaRPr lang="en-US" dirty="0"/>
           </a:p>
         </p:txBody>
       </p:sp>
@@ -15667,4 +16100,324 @@
   <a:objectDefaults/>
   <a:extraClrSchemeLst/>
 </a:theme>
+</file>
+
+<file path=ppt/theme/theme2.xml><?xml version="1.0" encoding="utf-8"?>
+<a:theme xmlns:a="http://schemas.openxmlformats.org/drawingml/2006/main" name="Office Theme">
+  <a:themeElements>
+    <a:clrScheme name="Office">
+      <a:dk1>
+        <a:sysClr val="windowText" lastClr="000000"/>
+      </a:dk1>
+      <a:lt1>
+        <a:sysClr val="window" lastClr="FFFFFF"/>
+      </a:lt1>
+      <a:dk2>
+        <a:srgbClr val="1F497D"/>
+      </a:dk2>
+      <a:lt2>
+        <a:srgbClr val="EEECE1"/>
+      </a:lt2>
+      <a:accent1>
+        <a:srgbClr val="4F81BD"/>
+      </a:accent1>
+      <a:accent2>
+        <a:srgbClr val="C0504D"/>
+      </a:accent2>
+      <a:accent3>
+        <a:srgbClr val="9BBB59"/>
+      </a:accent3>
+      <a:accent4>
+        <a:srgbClr val="8064A2"/>
+      </a:accent4>
+      <a:accent5>
+        <a:srgbClr val="4BACC6"/>
+      </a:accent5>
+      <a:accent6>
+        <a:srgbClr val="F79646"/>
+      </a:accent6>
+      <a:hlink>
+        <a:srgbClr val="0000FF"/>
+      </a:hlink>
+      <a:folHlink>
+        <a:srgbClr val="800080"/>
+      </a:folHlink>
+    </a:clrScheme>
+    <a:fontScheme name="Office">
+      <a:majorFont>
+        <a:latin typeface="Calibri"/>
+        <a:ea typeface=""/>
+        <a:cs typeface=""/>
+        <a:font script="Jpan" typeface="ＭＳ Ｐゴシック"/>
+        <a:font script="Hang" typeface="맑은 고딕"/>
+        <a:font script="Hans" typeface="宋体"/>
+        <a:font script="Hant" typeface="新細明體"/>
+        <a:font script="Arab" typeface="Times New Roman"/>
+        <a:font script="Hebr" typeface="Times New Roman"/>
+        <a:font script="Thai" typeface="Angsana New"/>
+        <a:font script="Ethi" typeface="Nyala"/>
+        <a:font script="Beng" typeface="Vrinda"/>
+        <a:font script="Gujr" typeface="Shruti"/>
+        <a:font script="Khmr" typeface="MoolBoran"/>
+        <a:font script="Knda" typeface="Tunga"/>
+        <a:font script="Guru" typeface="Raavi"/>
+        <a:font script="Cans" typeface="Euphemia"/>
+        <a:font script="Cher" typeface="Plantagenet Cherokee"/>
+        <a:font script="Yiii" typeface="Microsoft Yi Baiti"/>
+        <a:font script="Tibt" typeface="Microsoft Himalaya"/>
+        <a:font script="Thaa" typeface="MV Boli"/>
+        <a:font script="Deva" typeface="Mangal"/>
+        <a:font script="Telu" typeface="Gautami"/>
+        <a:font script="Taml" typeface="Latha"/>
+        <a:font script="Syrc" typeface="Estrangelo Edessa"/>
+        <a:font script="Orya" typeface="Kalinga"/>
+        <a:font script="Mlym" typeface="Kartika"/>
+        <a:font script="Laoo" typeface="DokChampa"/>
+        <a:font script="Sinh" typeface="Iskoola Pota"/>
+        <a:font script="Mong" typeface="Mongolian Baiti"/>
+        <a:font script="Viet" typeface="Times New Roman"/>
+        <a:font script="Uigh" typeface="Microsoft Uighur"/>
+        <a:font script="Geor" typeface="Sylfaen"/>
+      </a:majorFont>
+      <a:minorFont>
+        <a:latin typeface="Calibri"/>
+        <a:ea typeface=""/>
+        <a:cs typeface=""/>
+        <a:font script="Jpan" typeface="ＭＳ Ｐゴシック"/>
+        <a:font script="Hang" typeface="맑은 고딕"/>
+        <a:font script="Hans" typeface="宋体"/>
+        <a:font script="Hant" typeface="新細明體"/>
+        <a:font script="Arab" typeface="Arial"/>
+        <a:font script="Hebr" typeface="Arial"/>
+        <a:font script="Thai" typeface="Cordia New"/>
+        <a:font script="Ethi" typeface="Nyala"/>
+        <a:font script="Beng" typeface="Vrinda"/>
+        <a:font script="Gujr" typeface="Shruti"/>
+        <a:font script="Khmr" typeface="DaunPenh"/>
+        <a:font script="Knda" typeface="Tunga"/>
+        <a:font script="Guru" typeface="Raavi"/>
+        <a:font script="Cans" typeface="Euphemia"/>
+        <a:font script="Cher" typeface="Plantagenet Cherokee"/>
+        <a:font script="Yiii" typeface="Microsoft Yi Baiti"/>
+        <a:font script="Tibt" typeface="Microsoft Himalaya"/>
+        <a:font script="Thaa" typeface="MV Boli"/>
+        <a:font script="Deva" typeface="Mangal"/>
+        <a:font script="Telu" typeface="Gautami"/>
+        <a:font script="Taml" typeface="Latha"/>
+        <a:font script="Syrc" typeface="Estrangelo Edessa"/>
+        <a:font script="Orya" typeface="Kalinga"/>
+        <a:font script="Mlym" typeface="Kartika"/>
+        <a:font script="Laoo" typeface="DokChampa"/>
+        <a:font script="Sinh" typeface="Iskoola Pota"/>
+        <a:font script="Mong" typeface="Mongolian Baiti"/>
+        <a:font script="Viet" typeface="Arial"/>
+        <a:font script="Uigh" typeface="Microsoft Uighur"/>
+        <a:font script="Geor" typeface="Sylfaen"/>
+      </a:minorFont>
+    </a:fontScheme>
+    <a:fmtScheme name="Office">
+      <a:fillStyleLst>
+        <a:solidFill>
+          <a:schemeClr val="phClr"/>
+        </a:solidFill>
+        <a:gradFill rotWithShape="1">
+          <a:gsLst>
+            <a:gs pos="0">
+              <a:schemeClr val="phClr">
+                <a:tint val="50000"/>
+                <a:satMod val="300000"/>
+              </a:schemeClr>
+            </a:gs>
+            <a:gs pos="35000">
+              <a:schemeClr val="phClr">
+                <a:tint val="37000"/>
+                <a:satMod val="300000"/>
+              </a:schemeClr>
+            </a:gs>
+            <a:gs pos="100000">
+              <a:schemeClr val="phClr">
+                <a:tint val="15000"/>
+                <a:satMod val="350000"/>
+              </a:schemeClr>
+            </a:gs>
+          </a:gsLst>
+          <a:lin ang="16200000" scaled="1"/>
+        </a:gradFill>
+        <a:gradFill rotWithShape="1">
+          <a:gsLst>
+            <a:gs pos="0">
+              <a:schemeClr val="phClr">
+                <a:tint val="100000"/>
+                <a:shade val="100000"/>
+                <a:satMod val="130000"/>
+              </a:schemeClr>
+            </a:gs>
+            <a:gs pos="100000">
+              <a:schemeClr val="phClr">
+                <a:tint val="50000"/>
+                <a:shade val="100000"/>
+                <a:satMod val="350000"/>
+              </a:schemeClr>
+            </a:gs>
+          </a:gsLst>
+          <a:lin ang="16200000" scaled="0"/>
+        </a:gradFill>
+      </a:fillStyleLst>
+      <a:lnStyleLst>
+        <a:ln w="9525" cap="flat" cmpd="sng" algn="ctr">
+          <a:solidFill>
+            <a:schemeClr val="phClr">
+              <a:shade val="95000"/>
+              <a:satMod val="105000"/>
+            </a:schemeClr>
+          </a:solidFill>
+          <a:prstDash val="solid"/>
+        </a:ln>
+        <a:ln w="25400" cap="flat" cmpd="sng" algn="ctr">
+          <a:solidFill>
+            <a:schemeClr val="phClr"/>
+          </a:solidFill>
+          <a:prstDash val="solid"/>
+        </a:ln>
+        <a:ln w="38100" cap="flat" cmpd="sng" algn="ctr">
+          <a:solidFill>
+            <a:schemeClr val="phClr"/>
+          </a:solidFill>
+          <a:prstDash val="solid"/>
+        </a:ln>
+      </a:lnStyleLst>
+      <a:effectStyleLst>
+        <a:effectStyle>
+          <a:effectLst>
+            <a:outerShdw blurRad="40000" dist="20000" dir="5400000" rotWithShape="0">
+              <a:srgbClr val="000000">
+                <a:alpha val="38000"/>
+              </a:srgbClr>
+            </a:outerShdw>
+          </a:effectLst>
+        </a:effectStyle>
+        <a:effectStyle>
+          <a:effectLst>
+            <a:outerShdw blurRad="40000" dist="23000" dir="5400000" rotWithShape="0">
+              <a:srgbClr val="000000">
+                <a:alpha val="35000"/>
+              </a:srgbClr>
+            </a:outerShdw>
+          </a:effectLst>
+        </a:effectStyle>
+        <a:effectStyle>
+          <a:effectLst>
+            <a:outerShdw blurRad="40000" dist="23000" dir="5400000" rotWithShape="0">
+              <a:srgbClr val="000000">
+                <a:alpha val="35000"/>
+              </a:srgbClr>
+            </a:outerShdw>
+          </a:effectLst>
+          <a:scene3d>
+            <a:camera prst="orthographicFront">
+              <a:rot lat="0" lon="0" rev="0"/>
+            </a:camera>
+            <a:lightRig rig="threePt" dir="t">
+              <a:rot lat="0" lon="0" rev="1200000"/>
+            </a:lightRig>
+          </a:scene3d>
+          <a:sp3d>
+            <a:bevelT w="63500" h="25400"/>
+          </a:sp3d>
+        </a:effectStyle>
+      </a:effectStyleLst>
+      <a:bgFillStyleLst>
+        <a:solidFill>
+          <a:schemeClr val="phClr"/>
+        </a:solidFill>
+        <a:gradFill rotWithShape="1">
+          <a:gsLst>
+            <a:gs pos="0">
+              <a:schemeClr val="phClr">
+                <a:tint val="40000"/>
+                <a:satMod val="350000"/>
+              </a:schemeClr>
+            </a:gs>
+            <a:gs pos="40000">
+              <a:schemeClr val="phClr">
+                <a:tint val="45000"/>
+                <a:shade val="99000"/>
+                <a:satMod val="350000"/>
+              </a:schemeClr>
+            </a:gs>
+            <a:gs pos="100000">
+              <a:schemeClr val="phClr">
+                <a:shade val="20000"/>
+                <a:satMod val="255000"/>
+              </a:schemeClr>
+            </a:gs>
+          </a:gsLst>
+          <a:path path="circle">
+            <a:fillToRect l="50000" t="-80000" r="50000" b="180000"/>
+          </a:path>
+        </a:gradFill>
+        <a:gradFill rotWithShape="1">
+          <a:gsLst>
+            <a:gs pos="0">
+              <a:schemeClr val="phClr">
+                <a:tint val="80000"/>
+                <a:satMod val="300000"/>
+              </a:schemeClr>
+            </a:gs>
+            <a:gs pos="100000">
+              <a:schemeClr val="phClr">
+                <a:shade val="30000"/>
+                <a:satMod val="200000"/>
+              </a:schemeClr>
+            </a:gs>
+          </a:gsLst>
+          <a:path path="circle">
+            <a:fillToRect l="50000" t="50000" r="50000" b="50000"/>
+          </a:path>
+        </a:gradFill>
+      </a:bgFillStyleLst>
+    </a:fmtScheme>
+  </a:themeElements>
+  <a:objectDefaults>
+    <a:spDef>
+      <a:spPr/>
+      <a:bodyPr/>
+      <a:lstStyle/>
+      <a:style>
+        <a:lnRef idx="1">
+          <a:schemeClr val="accent1"/>
+        </a:lnRef>
+        <a:fillRef idx="3">
+          <a:schemeClr val="accent1"/>
+        </a:fillRef>
+        <a:effectRef idx="2">
+          <a:schemeClr val="accent1"/>
+        </a:effectRef>
+        <a:fontRef idx="minor">
+          <a:schemeClr val="lt1"/>
+        </a:fontRef>
+      </a:style>
+    </a:spDef>
+    <a:lnDef>
+      <a:spPr/>
+      <a:bodyPr/>
+      <a:lstStyle/>
+      <a:style>
+        <a:lnRef idx="2">
+          <a:schemeClr val="accent1"/>
+        </a:lnRef>
+        <a:fillRef idx="0">
+          <a:schemeClr val="accent1"/>
+        </a:fillRef>
+        <a:effectRef idx="1">
+          <a:schemeClr val="accent1"/>
+        </a:effectRef>
+        <a:fontRef idx="minor">
+          <a:schemeClr val="tx1"/>
+        </a:fontRef>
+      </a:style>
+    </a:lnDef>
+  </a:objectDefaults>
+  <a:extraClrSchemeLst/>
+</a:theme>
 </file>
</xml_diff>